<commit_message>
fixed a few diagrams
</commit_message>
<xml_diff>
--- a/key_diagram.pptx
+++ b/key_diagram.pptx
@@ -3175,8 +3175,8 @@
         </p:nvSpPr>
         <p:spPr>
           <a:xfrm>
-            <a:off x="6712856" y="5048856"/>
-            <a:ext cx="1305098" cy="1388175"/>
+            <a:off x="6712856" y="4340538"/>
+            <a:ext cx="1305098" cy="2096494"/>
           </a:xfrm>
           <a:prstGeom prst="rect">
             <a:avLst/>
@@ -4357,8 +4357,8 @@
         </p:nvSpPr>
         <p:spPr>
           <a:xfrm>
-            <a:off x="8918588" y="4392321"/>
-            <a:ext cx="806631" cy="461665"/>
+            <a:off x="8974693" y="4392321"/>
+            <a:ext cx="694421" cy="461665"/>
           </a:xfrm>
           <a:prstGeom prst="rect">
             <a:avLst/>
@@ -4379,14 +4379,6 @@
                 <a:cs typeface="Consolas" charset="0"/>
               </a:rPr>
               <a:t>Age</a:t>
-            </a:r>
-            <a:r>
-              <a:rPr lang="en-US" sz="2400" b="1" baseline="-25000" dirty="0" smtClean="0">
-                <a:latin typeface="Consolas" charset="0"/>
-                <a:ea typeface="Consolas" charset="0"/>
-                <a:cs typeface="Consolas" charset="0"/>
-              </a:rPr>
-              <a:t>1</a:t>
             </a:r>
             <a:endParaRPr lang="en-US" sz="2400" b="1" dirty="0">
               <a:latin typeface="Consolas" charset="0"/>
@@ -4478,7 +4470,7 @@
         </p:nvSpPr>
         <p:spPr>
           <a:xfrm>
-            <a:off x="8634854" y="5057465"/>
+            <a:off x="8634856" y="5057465"/>
             <a:ext cx="1374095" cy="461665"/>
           </a:xfrm>
           <a:prstGeom prst="rect">
@@ -4499,7 +4491,7 @@
                 <a:ea typeface="Consolas" charset="0"/>
                 <a:cs typeface="Consolas" charset="0"/>
               </a:rPr>
-              <a:t>Marital</a:t>
+              <a:t>Married</a:t>
             </a:r>
             <a:endParaRPr lang="en-US" sz="2400" b="1" dirty="0">
               <a:latin typeface="Consolas" charset="0"/>
@@ -5190,7 +5182,7 @@
         </p:nvSpPr>
         <p:spPr>
           <a:xfrm>
-            <a:off x="2250136" y="1500407"/>
+            <a:off x="2249135" y="1546534"/>
             <a:ext cx="1324402" cy="369332"/>
           </a:xfrm>
           <a:prstGeom prst="rect">
@@ -5234,7 +5226,7 @@
         </p:nvSpPr>
         <p:spPr>
           <a:xfrm>
-            <a:off x="4218387" y="1430674"/>
+            <a:off x="4216124" y="1513175"/>
             <a:ext cx="2084225" cy="646331"/>
           </a:xfrm>
           <a:prstGeom prst="rect">
@@ -5293,7 +5285,7 @@
         </p:nvSpPr>
         <p:spPr>
           <a:xfrm>
-            <a:off x="8457168" y="1693099"/>
+            <a:off x="8457168" y="1767037"/>
             <a:ext cx="1704313" cy="369332"/>
           </a:xfrm>
           <a:prstGeom prst="rect">
@@ -5338,7 +5330,7 @@
         </p:nvSpPr>
         <p:spPr>
           <a:xfrm>
-            <a:off x="6571615" y="3494666"/>
+            <a:off x="6571613" y="3421599"/>
             <a:ext cx="1577676" cy="923330"/>
           </a:xfrm>
           <a:prstGeom prst="rect">
@@ -5469,7 +5461,7 @@
           <a:p>
             <a:pPr algn="ctr"/>
             <a:r>
-              <a:rPr lang="en-US" b="1" smtClean="0">
+              <a:rPr lang="en-US" b="1" dirty="0" smtClean="0">
                 <a:solidFill>
                   <a:schemeClr val="tx2"/>
                 </a:solidFill>
@@ -5513,7 +5505,7 @@
         <p:spPr>
           <a:xfrm>
             <a:off x="6707904" y="4358899"/>
-            <a:ext cx="1314022" cy="689957"/>
+            <a:ext cx="1305095" cy="689957"/>
           </a:xfrm>
           <a:prstGeom prst="rect">
             <a:avLst/>

</xml_diff>